<commit_message>
new mutation statistic in all plots
</commit_message>
<xml_diff>
--- a/THEE_presentation.pptx
+++ b/THEE_presentation.pptx
@@ -1906,10 +1906,14 @@
             <a:defRPr cap="all"/>
           </a:pPr>
           <a:r>
-            <a:rPr lang="de-CH"/>
-            <a:t>Results and conclusion</a:t>
+            <a:rPr lang="de-CH" dirty="0" err="1"/>
+            <a:t>Results</a:t>
           </a:r>
-          <a:endParaRPr lang="en-US"/>
+          <a:r>
+            <a:rPr lang="de-CH" dirty="0"/>
+            <a:t> </a:t>
+          </a:r>
+          <a:endParaRPr lang="en-US" dirty="0"/>
         </a:p>
       </dgm:t>
     </dgm:pt>
@@ -1949,10 +1953,18 @@
             <a:defRPr cap="all"/>
           </a:pPr>
           <a:r>
-            <a:rPr lang="de-CH"/>
-            <a:t>Biological applications</a:t>
+            <a:rPr lang="de-CH" dirty="0" err="1"/>
+            <a:t>Discussion</a:t>
           </a:r>
-          <a:endParaRPr lang="en-US"/>
+          <a:r>
+            <a:rPr lang="de-CH" dirty="0"/>
+            <a:t> &amp; Biological </a:t>
+          </a:r>
+          <a:r>
+            <a:rPr lang="de-CH" dirty="0" err="1"/>
+            <a:t>applications</a:t>
+          </a:r>
+          <a:endParaRPr lang="en-US" dirty="0"/>
         </a:p>
       </dgm:t>
     </dgm:pt>
@@ -2708,7 +2720,7 @@
         </a:bodyPr>
         <a:lstStyle/>
         <a:p>
-          <a:pPr marL="0" lvl="0" indent="0" algn="ctr" defTabSz="889000">
+          <a:pPr marL="0" lvl="0" indent="0" algn="ctr" defTabSz="666750">
             <a:lnSpc>
               <a:spcPct val="100000"/>
             </a:lnSpc>
@@ -2722,10 +2734,10 @@
             <a:defRPr cap="all"/>
           </a:pPr>
           <a:r>
-            <a:rPr lang="de-CH" sz="2000" kern="1200"/>
+            <a:rPr lang="de-CH" sz="1500" kern="1200"/>
             <a:t>Hypothesis and predictions</a:t>
           </a:r>
-          <a:endParaRPr lang="en-US" sz="2000" kern="1200"/>
+          <a:endParaRPr lang="en-US" sz="1500" kern="1200"/>
         </a:p>
       </dsp:txBody>
       <dsp:txXfrm>
@@ -2862,7 +2874,7 @@
         </a:bodyPr>
         <a:lstStyle/>
         <a:p>
-          <a:pPr marL="0" lvl="0" indent="0" algn="ctr" defTabSz="889000">
+          <a:pPr marL="0" lvl="0" indent="0" algn="ctr" defTabSz="666750">
             <a:lnSpc>
               <a:spcPct val="100000"/>
             </a:lnSpc>
@@ -2876,10 +2888,10 @@
             <a:defRPr cap="all"/>
           </a:pPr>
           <a:r>
-            <a:rPr lang="de-CH" sz="2000" kern="1200"/>
+            <a:rPr lang="de-CH" sz="1500" kern="1200"/>
             <a:t>Method </a:t>
           </a:r>
-          <a:endParaRPr lang="en-US" sz="2000" kern="1200"/>
+          <a:endParaRPr lang="en-US" sz="1500" kern="1200"/>
         </a:p>
       </dsp:txBody>
       <dsp:txXfrm>
@@ -3016,7 +3028,7 @@
         </a:bodyPr>
         <a:lstStyle/>
         <a:p>
-          <a:pPr marL="0" lvl="0" indent="0" algn="ctr" defTabSz="889000">
+          <a:pPr marL="0" lvl="0" indent="0" algn="ctr" defTabSz="666750">
             <a:lnSpc>
               <a:spcPct val="100000"/>
             </a:lnSpc>
@@ -3030,10 +3042,14 @@
             <a:defRPr cap="all"/>
           </a:pPr>
           <a:r>
-            <a:rPr lang="de-CH" sz="2000" kern="1200"/>
-            <a:t>Results and conclusion</a:t>
+            <a:rPr lang="de-CH" sz="1500" kern="1200" dirty="0" err="1"/>
+            <a:t>Results</a:t>
           </a:r>
-          <a:endParaRPr lang="en-US" sz="2000" kern="1200"/>
+          <a:r>
+            <a:rPr lang="de-CH" sz="1500" kern="1200" dirty="0"/>
+            <a:t> </a:t>
+          </a:r>
+          <a:endParaRPr lang="en-US" sz="1500" kern="1200" dirty="0"/>
         </a:p>
       </dsp:txBody>
       <dsp:txXfrm>
@@ -3170,7 +3186,7 @@
         </a:bodyPr>
         <a:lstStyle/>
         <a:p>
-          <a:pPr marL="0" lvl="0" indent="0" algn="ctr" defTabSz="889000">
+          <a:pPr marL="0" lvl="0" indent="0" algn="ctr" defTabSz="666750">
             <a:lnSpc>
               <a:spcPct val="100000"/>
             </a:lnSpc>
@@ -3184,10 +3200,18 @@
             <a:defRPr cap="all"/>
           </a:pPr>
           <a:r>
-            <a:rPr lang="de-CH" sz="2000" kern="1200"/>
-            <a:t>Biological applications</a:t>
+            <a:rPr lang="de-CH" sz="1500" kern="1200" dirty="0" err="1"/>
+            <a:t>Discussion</a:t>
           </a:r>
-          <a:endParaRPr lang="en-US" sz="2000" kern="1200"/>
+          <a:r>
+            <a:rPr lang="de-CH" sz="1500" kern="1200" dirty="0"/>
+            <a:t> &amp; Biological </a:t>
+          </a:r>
+          <a:r>
+            <a:rPr lang="de-CH" sz="1500" kern="1200" dirty="0" err="1"/>
+            <a:t>applications</a:t>
+          </a:r>
+          <a:endParaRPr lang="en-US" sz="1500" kern="1200" dirty="0"/>
         </a:p>
       </dsp:txBody>
       <dsp:txXfrm>
@@ -6568,7 +6592,7 @@
           <a:p>
             <a:fld id="{256E0D5A-877C-43E6-8161-BEA82FD88084}" type="datetimeFigureOut">
               <a:rPr lang="de-CH" smtClean="0"/>
-              <a:t>28.10.2025</a:t>
+              <a:t>29.10.2025</a:t>
             </a:fld>
             <a:endParaRPr lang="de-CH"/>
           </a:p>
@@ -6622,7 +6646,7 @@
           <a:p>
             <a:fld id="{2A07F06B-CB54-47B8-86A8-70FF2417EE14}" type="slidenum">
               <a:rPr lang="de-CH" smtClean="0"/>
-              <a:t>‹#›</a:t>
+              <a:t>‹Nr.›</a:t>
             </a:fld>
             <a:endParaRPr lang="de-CH"/>
           </a:p>
@@ -6768,7 +6792,7 @@
           <a:p>
             <a:fld id="{256E0D5A-877C-43E6-8161-BEA82FD88084}" type="datetimeFigureOut">
               <a:rPr lang="de-CH" smtClean="0"/>
-              <a:t>28.10.2025</a:t>
+              <a:t>29.10.2025</a:t>
             </a:fld>
             <a:endParaRPr lang="de-CH"/>
           </a:p>
@@ -6822,7 +6846,7 @@
           <a:p>
             <a:fld id="{2A07F06B-CB54-47B8-86A8-70FF2417EE14}" type="slidenum">
               <a:rPr lang="de-CH" smtClean="0"/>
-              <a:t>‹#›</a:t>
+              <a:t>‹Nr.›</a:t>
             </a:fld>
             <a:endParaRPr lang="de-CH"/>
           </a:p>
@@ -6978,7 +7002,7 @@
           <a:p>
             <a:fld id="{256E0D5A-877C-43E6-8161-BEA82FD88084}" type="datetimeFigureOut">
               <a:rPr lang="de-CH" smtClean="0"/>
-              <a:t>28.10.2025</a:t>
+              <a:t>29.10.2025</a:t>
             </a:fld>
             <a:endParaRPr lang="de-CH"/>
           </a:p>
@@ -7032,7 +7056,7 @@
           <a:p>
             <a:fld id="{2A07F06B-CB54-47B8-86A8-70FF2417EE14}" type="slidenum">
               <a:rPr lang="de-CH" smtClean="0"/>
-              <a:t>‹#›</a:t>
+              <a:t>‹Nr.›</a:t>
             </a:fld>
             <a:endParaRPr lang="de-CH"/>
           </a:p>
@@ -7178,7 +7202,7 @@
           <a:p>
             <a:fld id="{256E0D5A-877C-43E6-8161-BEA82FD88084}" type="datetimeFigureOut">
               <a:rPr lang="de-CH" smtClean="0"/>
-              <a:t>28.10.2025</a:t>
+              <a:t>29.10.2025</a:t>
             </a:fld>
             <a:endParaRPr lang="de-CH"/>
           </a:p>
@@ -7232,7 +7256,7 @@
           <a:p>
             <a:fld id="{2A07F06B-CB54-47B8-86A8-70FF2417EE14}" type="slidenum">
               <a:rPr lang="de-CH" smtClean="0"/>
-              <a:t>‹#›</a:t>
+              <a:t>‹Nr.›</a:t>
             </a:fld>
             <a:endParaRPr lang="de-CH"/>
           </a:p>
@@ -7454,7 +7478,7 @@
           <a:p>
             <a:fld id="{256E0D5A-877C-43E6-8161-BEA82FD88084}" type="datetimeFigureOut">
               <a:rPr lang="de-CH" smtClean="0"/>
-              <a:t>28.10.2025</a:t>
+              <a:t>29.10.2025</a:t>
             </a:fld>
             <a:endParaRPr lang="de-CH"/>
           </a:p>
@@ -7508,7 +7532,7 @@
           <a:p>
             <a:fld id="{2A07F06B-CB54-47B8-86A8-70FF2417EE14}" type="slidenum">
               <a:rPr lang="de-CH" smtClean="0"/>
-              <a:t>‹#›</a:t>
+              <a:t>‹Nr.›</a:t>
             </a:fld>
             <a:endParaRPr lang="de-CH"/>
           </a:p>
@@ -7722,7 +7746,7 @@
           <a:p>
             <a:fld id="{256E0D5A-877C-43E6-8161-BEA82FD88084}" type="datetimeFigureOut">
               <a:rPr lang="de-CH" smtClean="0"/>
-              <a:t>28.10.2025</a:t>
+              <a:t>29.10.2025</a:t>
             </a:fld>
             <a:endParaRPr lang="de-CH"/>
           </a:p>
@@ -7776,7 +7800,7 @@
           <a:p>
             <a:fld id="{2A07F06B-CB54-47B8-86A8-70FF2417EE14}" type="slidenum">
               <a:rPr lang="de-CH" smtClean="0"/>
-              <a:t>‹#›</a:t>
+              <a:t>‹Nr.›</a:t>
             </a:fld>
             <a:endParaRPr lang="de-CH"/>
           </a:p>
@@ -8137,7 +8161,7 @@
           <a:p>
             <a:fld id="{256E0D5A-877C-43E6-8161-BEA82FD88084}" type="datetimeFigureOut">
               <a:rPr lang="de-CH" smtClean="0"/>
-              <a:t>28.10.2025</a:t>
+              <a:t>29.10.2025</a:t>
             </a:fld>
             <a:endParaRPr lang="de-CH"/>
           </a:p>
@@ -8191,7 +8215,7 @@
           <a:p>
             <a:fld id="{2A07F06B-CB54-47B8-86A8-70FF2417EE14}" type="slidenum">
               <a:rPr lang="de-CH" smtClean="0"/>
-              <a:t>‹#›</a:t>
+              <a:t>‹Nr.›</a:t>
             </a:fld>
             <a:endParaRPr lang="de-CH"/>
           </a:p>
@@ -8279,7 +8303,7 @@
           <a:p>
             <a:fld id="{256E0D5A-877C-43E6-8161-BEA82FD88084}" type="datetimeFigureOut">
               <a:rPr lang="de-CH" smtClean="0"/>
-              <a:t>28.10.2025</a:t>
+              <a:t>29.10.2025</a:t>
             </a:fld>
             <a:endParaRPr lang="de-CH"/>
           </a:p>
@@ -8333,7 +8357,7 @@
           <a:p>
             <a:fld id="{2A07F06B-CB54-47B8-86A8-70FF2417EE14}" type="slidenum">
               <a:rPr lang="de-CH" smtClean="0"/>
-              <a:t>‹#›</a:t>
+              <a:t>‹Nr.›</a:t>
             </a:fld>
             <a:endParaRPr lang="de-CH"/>
           </a:p>
@@ -8392,7 +8416,7 @@
           <a:p>
             <a:fld id="{256E0D5A-877C-43E6-8161-BEA82FD88084}" type="datetimeFigureOut">
               <a:rPr lang="de-CH" smtClean="0"/>
-              <a:t>28.10.2025</a:t>
+              <a:t>29.10.2025</a:t>
             </a:fld>
             <a:endParaRPr lang="de-CH"/>
           </a:p>
@@ -8446,7 +8470,7 @@
           <a:p>
             <a:fld id="{2A07F06B-CB54-47B8-86A8-70FF2417EE14}" type="slidenum">
               <a:rPr lang="de-CH" smtClean="0"/>
-              <a:t>‹#›</a:t>
+              <a:t>‹Nr.›</a:t>
             </a:fld>
             <a:endParaRPr lang="de-CH"/>
           </a:p>
@@ -8705,7 +8729,7 @@
           <a:p>
             <a:fld id="{256E0D5A-877C-43E6-8161-BEA82FD88084}" type="datetimeFigureOut">
               <a:rPr lang="de-CH" smtClean="0"/>
-              <a:t>28.10.2025</a:t>
+              <a:t>29.10.2025</a:t>
             </a:fld>
             <a:endParaRPr lang="de-CH"/>
           </a:p>
@@ -8759,7 +8783,7 @@
           <a:p>
             <a:fld id="{2A07F06B-CB54-47B8-86A8-70FF2417EE14}" type="slidenum">
               <a:rPr lang="de-CH" smtClean="0"/>
-              <a:t>‹#›</a:t>
+              <a:t>‹Nr.›</a:t>
             </a:fld>
             <a:endParaRPr lang="de-CH"/>
           </a:p>
@@ -8994,7 +9018,7 @@
           <a:p>
             <a:fld id="{256E0D5A-877C-43E6-8161-BEA82FD88084}" type="datetimeFigureOut">
               <a:rPr lang="de-CH" smtClean="0"/>
-              <a:t>28.10.2025</a:t>
+              <a:t>29.10.2025</a:t>
             </a:fld>
             <a:endParaRPr lang="de-CH"/>
           </a:p>
@@ -9048,7 +9072,7 @@
           <a:p>
             <a:fld id="{2A07F06B-CB54-47B8-86A8-70FF2417EE14}" type="slidenum">
               <a:rPr lang="de-CH" smtClean="0"/>
-              <a:t>‹#›</a:t>
+              <a:t>‹Nr.›</a:t>
             </a:fld>
             <a:endParaRPr lang="de-CH"/>
           </a:p>
@@ -9237,7 +9261,7 @@
           <a:p>
             <a:fld id="{256E0D5A-877C-43E6-8161-BEA82FD88084}" type="datetimeFigureOut">
               <a:rPr lang="de-CH" smtClean="0"/>
-              <a:t>28.10.2025</a:t>
+              <a:t>29.10.2025</a:t>
             </a:fld>
             <a:endParaRPr lang="de-CH"/>
           </a:p>
@@ -9327,7 +9351,7 @@
           <a:p>
             <a:fld id="{2A07F06B-CB54-47B8-86A8-70FF2417EE14}" type="slidenum">
               <a:rPr lang="de-CH" smtClean="0"/>
-              <a:t>‹#›</a:t>
+              <a:t>‹Nr.›</a:t>
             </a:fld>
             <a:endParaRPr lang="de-CH"/>
           </a:p>
@@ -11466,7 +11490,7 @@
             <p:ph idx="1"/>
             <p:extLst>
               <p:ext uri="{D42A27DB-BD31-4B8C-83A1-F6EECF244321}">
-                <p14:modId xmlns:p14="http://schemas.microsoft.com/office/powerpoint/2010/main" val="2395582769"/>
+                <p14:modId xmlns:p14="http://schemas.microsoft.com/office/powerpoint/2010/main" val="133957413"/>
               </p:ext>
             </p:extLst>
           </p:nvPr>

</xml_diff>